<commit_message>
Corrections to Pandas material
</commit_message>
<xml_diff>
--- a/Intro May8-9 SWC.pptx
+++ b/Intro May8-9 SWC.pptx
@@ -395,7 +395,7 @@
           <a:p>
             <a:fld id="{CA39804F-B34E-E142-A0B9-4EA8B136DDEE}" type="datetimeFigureOut">
               <a:rPr lang="en-US" smtClean="0"/>
-              <a:t>07/05/2014</a:t>
+              <a:t>08/05/2014</a:t>
             </a:fld>
             <a:endParaRPr lang="en-US"/>
           </a:p>
@@ -587,7 +587,7 @@
           <a:p>
             <a:fld id="{CA39804F-B34E-E142-A0B9-4EA8B136DDEE}" type="datetimeFigureOut">
               <a:rPr lang="en-US" smtClean="0"/>
-              <a:t>07/05/2014</a:t>
+              <a:t>08/05/2014</a:t>
             </a:fld>
             <a:endParaRPr lang="en-US"/>
           </a:p>
@@ -856,7 +856,7 @@
           <a:p>
             <a:fld id="{CA39804F-B34E-E142-A0B9-4EA8B136DDEE}" type="datetimeFigureOut">
               <a:rPr lang="en-US" smtClean="0"/>
-              <a:t>07/05/2014</a:t>
+              <a:t>08/05/2014</a:t>
             </a:fld>
             <a:endParaRPr lang="en-US"/>
           </a:p>
@@ -1035,7 +1035,7 @@
           <a:p>
             <a:fld id="{CA39804F-B34E-E142-A0B9-4EA8B136DDEE}" type="datetimeFigureOut">
               <a:rPr lang="en-US" smtClean="0"/>
-              <a:t>07/05/2014</a:t>
+              <a:t>08/05/2014</a:t>
             </a:fld>
             <a:endParaRPr lang="en-US"/>
           </a:p>
@@ -1204,7 +1204,7 @@
           <a:p>
             <a:fld id="{CA39804F-B34E-E142-A0B9-4EA8B136DDEE}" type="datetimeFigureOut">
               <a:rPr lang="en-US" smtClean="0"/>
-              <a:t>07/05/2014</a:t>
+              <a:t>08/05/2014</a:t>
             </a:fld>
             <a:endParaRPr lang="en-US"/>
           </a:p>
@@ -1446,7 +1446,7 @@
           <a:p>
             <a:fld id="{CA39804F-B34E-E142-A0B9-4EA8B136DDEE}" type="datetimeFigureOut">
               <a:rPr lang="en-US" smtClean="0"/>
-              <a:t>07/05/2014</a:t>
+              <a:t>08/05/2014</a:t>
             </a:fld>
             <a:endParaRPr lang="en-US"/>
           </a:p>
@@ -1769,7 +1769,7 @@
           <a:p>
             <a:fld id="{CA39804F-B34E-E142-A0B9-4EA8B136DDEE}" type="datetimeFigureOut">
               <a:rPr lang="en-US" smtClean="0"/>
-              <a:t>07/05/2014</a:t>
+              <a:t>08/05/2014</a:t>
             </a:fld>
             <a:endParaRPr lang="en-US"/>
           </a:p>
@@ -2067,7 +2067,7 @@
           <a:p>
             <a:fld id="{CA39804F-B34E-E142-A0B9-4EA8B136DDEE}" type="datetimeFigureOut">
               <a:rPr lang="en-US" smtClean="0"/>
-              <a:t>07/05/2014</a:t>
+              <a:t>08/05/2014</a:t>
             </a:fld>
             <a:endParaRPr lang="en-US"/>
           </a:p>
@@ -2523,7 +2523,7 @@
           <a:p>
             <a:fld id="{CA39804F-B34E-E142-A0B9-4EA8B136DDEE}" type="datetimeFigureOut">
               <a:rPr lang="en-US" smtClean="0"/>
-              <a:t>07/05/2014</a:t>
+              <a:t>08/05/2014</a:t>
             </a:fld>
             <a:endParaRPr lang="en-US"/>
           </a:p>
@@ -2636,7 +2636,7 @@
           <a:p>
             <a:fld id="{CA39804F-B34E-E142-A0B9-4EA8B136DDEE}" type="datetimeFigureOut">
               <a:rPr lang="en-US" smtClean="0"/>
-              <a:t>07/05/2014</a:t>
+              <a:t>08/05/2014</a:t>
             </a:fld>
             <a:endParaRPr lang="en-US"/>
           </a:p>
@@ -2726,7 +2726,7 @@
           <a:p>
             <a:fld id="{CA39804F-B34E-E142-A0B9-4EA8B136DDEE}" type="datetimeFigureOut">
               <a:rPr lang="en-US" smtClean="0"/>
-              <a:t>07/05/2014</a:t>
+              <a:t>08/05/2014</a:t>
             </a:fld>
             <a:endParaRPr lang="en-US"/>
           </a:p>
@@ -3008,7 +3008,7 @@
           <a:p>
             <a:fld id="{CA39804F-B34E-E142-A0B9-4EA8B136DDEE}" type="datetimeFigureOut">
               <a:rPr lang="en-US" smtClean="0"/>
-              <a:t>07/05/2014</a:t>
+              <a:t>08/05/2014</a:t>
             </a:fld>
             <a:endParaRPr lang="en-US"/>
           </a:p>
@@ -3214,7 +3214,7 @@
           <a:p>
             <a:fld id="{CA39804F-B34E-E142-A0B9-4EA8B136DDEE}" type="datetimeFigureOut">
               <a:rPr lang="en-US" smtClean="0"/>
-              <a:t>07/05/2014</a:t>
+              <a:t>08/05/2014</a:t>
             </a:fld>
             <a:endParaRPr lang="en-US"/>
           </a:p>
@@ -3920,7 +3920,11 @@
             </a:r>
             <a:r>
               <a:rPr lang="en-US" dirty="0" smtClean="0"/>
-              <a:t>, R Carey</a:t>
+              <a:t>, </a:t>
+            </a:r>
+            <a:r>
+              <a:rPr lang="en-US" dirty="0" smtClean="0"/>
+              <a:t>Mark</a:t>
             </a:r>
             <a:endParaRPr lang="en-US" b="1" dirty="0"/>
           </a:p>

</xml_diff>